<commit_message>
Update Think in EFW①Java基礎v1.0.pptx
</commit_message>
<xml_diff>
--- a/Think in EFW①Java基礎v1.0.pptx
+++ b/Think in EFW①Java基礎v1.0.pptx
@@ -351,7 +351,7 @@
               <a:pPr>
                 <a:defRPr/>
               </a:pPr>
-              <a:t>2023/5/26</a:t>
+              <a:t>2024/10/3</a:t>
             </a:fld>
             <a:endParaRPr lang="en-US" altLang="ja-JP"/>
           </a:p>
@@ -653,7 +653,7 @@
               <a:pPr>
                 <a:defRPr/>
               </a:pPr>
-              <a:t>2023/5/26</a:t>
+              <a:t>2024/10/3</a:t>
             </a:fld>
             <a:endParaRPr lang="en-US" altLang="ja-JP"/>
           </a:p>
@@ -28742,7 +28742,7 @@
           <p:nvPr>
             <p:extLst>
               <p:ext uri="{D42A27DB-BD31-4B8C-83A1-F6EECF244321}">
-                <p14:modId xmlns:p14="http://schemas.microsoft.com/office/powerpoint/2010/main" val="2845812780"/>
+                <p14:modId xmlns:p14="http://schemas.microsoft.com/office/powerpoint/2010/main" val="3412066500"/>
               </p:ext>
             </p:extLst>
           </p:nvPr>
@@ -29844,9 +29844,9 @@
                     <a:lstStyle/>
                     <a:p>
                       <a:r>
-                        <a:rPr kumimoji="1" lang="en-US" altLang="ja-JP" sz="1400" kern="1200" dirty="0" err="1">
+                        <a:rPr kumimoji="1" lang="en-US" altLang="ja-JP" sz="1400" strike="sngStrike" kern="1200" baseline="0" dirty="0" err="1">
                           <a:solidFill>
-                            <a:schemeClr val="dk1"/>
+                            <a:srgbClr val="FF0000"/>
                           </a:solidFill>
                           <a:latin typeface="+mn-lt"/>
                           <a:ea typeface="+mn-ea"/>
@@ -29854,7 +29854,11 @@
                         </a:rPr>
                         <a:t>partServlet</a:t>
                       </a:r>
-                      <a:endParaRPr kumimoji="1" lang="ja-JP" altLang="en-US" sz="1400" u="none" dirty="0"/>
+                      <a:endParaRPr kumimoji="1" lang="ja-JP" altLang="en-US" sz="1400" u="none" strike="sngStrike" baseline="0" dirty="0">
+                        <a:solidFill>
+                          <a:srgbClr val="FF0000"/>
+                        </a:solidFill>
+                      </a:endParaRPr>
                     </a:p>
                   </a:txBody>
                   <a:tcPr/>
@@ -29865,9 +29869,9 @@
                     <a:lstStyle/>
                     <a:p>
                       <a:r>
-                        <a:rPr kumimoji="1" lang="en-US" altLang="ja-JP" sz="1400" kern="1200" dirty="0">
+                        <a:rPr kumimoji="1" lang="en-US" altLang="ja-JP" sz="1400" strike="sngStrike" kern="1200" baseline="0" dirty="0">
                           <a:solidFill>
-                            <a:schemeClr val="dk1"/>
+                            <a:srgbClr val="FF0000"/>
                           </a:solidFill>
                           <a:latin typeface="+mn-lt"/>
                           <a:ea typeface="+mn-ea"/>
@@ -29876,9 +29880,9 @@
                         <a:t>/</a:t>
                       </a:r>
                       <a:r>
-                        <a:rPr kumimoji="1" lang="en-US" altLang="ja-JP" sz="1400" kern="1200" dirty="0" err="1">
+                        <a:rPr kumimoji="1" lang="en-US" altLang="ja-JP" sz="1400" strike="sngStrike" kern="1200" baseline="0" dirty="0" err="1">
                           <a:solidFill>
-                            <a:schemeClr val="dk1"/>
+                            <a:srgbClr val="FF0000"/>
                           </a:solidFill>
                           <a:latin typeface="+mn-lt"/>
                           <a:ea typeface="+mn-ea"/>
@@ -29886,7 +29890,11 @@
                         </a:rPr>
                         <a:t>partServlet</a:t>
                       </a:r>
-                      <a:endParaRPr kumimoji="1" lang="ja-JP" altLang="en-US" sz="1400" dirty="0"/>
+                      <a:endParaRPr kumimoji="1" lang="ja-JP" altLang="en-US" sz="1400" strike="sngStrike" baseline="0" dirty="0">
+                        <a:solidFill>
+                          <a:srgbClr val="FF0000"/>
+                        </a:solidFill>
+                      </a:endParaRPr>
                     </a:p>
                   </a:txBody>
                   <a:tcPr/>
@@ -29897,10 +29905,18 @@
                     <a:lstStyle/>
                     <a:p>
                       <a:r>
-                        <a:rPr kumimoji="1" lang="en-US" altLang="ja-JP" sz="1400" dirty="0"/>
+                        <a:rPr kumimoji="1" lang="en-US" altLang="ja-JP" sz="1400" strike="sngStrike" baseline="0" dirty="0">
+                          <a:solidFill>
+                            <a:srgbClr val="FF0000"/>
+                          </a:solidFill>
+                        </a:rPr>
                         <a:t>-</a:t>
                       </a:r>
-                      <a:endParaRPr kumimoji="1" lang="ja-JP" altLang="en-US" sz="1400" dirty="0"/>
+                      <a:endParaRPr kumimoji="1" lang="ja-JP" altLang="en-US" sz="1400" strike="sngStrike" baseline="0" dirty="0">
+                        <a:solidFill>
+                          <a:srgbClr val="FF0000"/>
+                        </a:solidFill>
+                      </a:endParaRPr>
                     </a:p>
                   </a:txBody>
                   <a:tcPr/>
@@ -29911,32 +29927,64 @@
                     <a:lstStyle/>
                     <a:p>
                       <a:r>
-                        <a:rPr kumimoji="1" lang="ja-JP" altLang="en-US" sz="1400" dirty="0"/>
+                        <a:rPr kumimoji="1" lang="ja-JP" altLang="en-US" sz="1400" strike="sngStrike" baseline="0" dirty="0">
+                          <a:solidFill>
+                            <a:srgbClr val="FF0000"/>
+                          </a:solidFill>
+                        </a:rPr>
                         <a:t>リモート部品接続のプリ処理を行う。</a:t>
                       </a:r>
-                      <a:endParaRPr kumimoji="1" lang="en-US" altLang="ja-JP" sz="1400" dirty="0"/>
+                      <a:endParaRPr kumimoji="1" lang="en-US" altLang="ja-JP" sz="1400" strike="sngStrike" baseline="0" dirty="0">
+                        <a:solidFill>
+                          <a:srgbClr val="FF0000"/>
+                        </a:solidFill>
+                      </a:endParaRPr>
                     </a:p>
                     <a:p>
                       <a:r>
-                        <a:rPr kumimoji="1" lang="ja-JP" altLang="en-US" sz="1400" dirty="0"/>
+                        <a:rPr kumimoji="1" lang="ja-JP" altLang="en-US" sz="1400" strike="sngStrike" baseline="0" dirty="0">
+                          <a:solidFill>
+                            <a:srgbClr val="FF0000"/>
+                          </a:solidFill>
+                        </a:rPr>
                         <a:t>・暗号化</a:t>
                       </a:r>
                       <a:r>
-                        <a:rPr kumimoji="1" lang="en-US" altLang="ja-JP" sz="1400" dirty="0"/>
+                        <a:rPr kumimoji="1" lang="en-US" altLang="ja-JP" sz="1400" strike="sngStrike" baseline="0" dirty="0">
+                          <a:solidFill>
+                            <a:srgbClr val="FF0000"/>
+                          </a:solidFill>
+                        </a:rPr>
                         <a:t>URL</a:t>
                       </a:r>
                       <a:r>
-                        <a:rPr kumimoji="1" lang="ja-JP" altLang="en-US" sz="1400" dirty="0"/>
+                        <a:rPr kumimoji="1" lang="ja-JP" altLang="en-US" sz="1400" strike="sngStrike" baseline="0" dirty="0">
+                          <a:solidFill>
+                            <a:srgbClr val="FF0000"/>
+                          </a:solidFill>
+                        </a:rPr>
                         <a:t>を解読する。</a:t>
                       </a:r>
-                      <a:endParaRPr kumimoji="1" lang="en-US" altLang="ja-JP" sz="1400" dirty="0"/>
+                      <a:endParaRPr kumimoji="1" lang="en-US" altLang="ja-JP" sz="1400" strike="sngStrike" baseline="0" dirty="0">
+                        <a:solidFill>
+                          <a:srgbClr val="FF0000"/>
+                        </a:solidFill>
+                      </a:endParaRPr>
                     </a:p>
                     <a:p>
                       <a:r>
-                        <a:rPr kumimoji="1" lang="ja-JP" altLang="en-US" sz="1400" dirty="0"/>
+                        <a:rPr kumimoji="1" lang="ja-JP" altLang="en-US" sz="1400" strike="sngStrike" baseline="0" dirty="0">
+                          <a:solidFill>
+                            <a:srgbClr val="FF0000"/>
+                          </a:solidFill>
+                        </a:rPr>
                         <a:t>・メインサーバからのセッション情報をサブサーバに設定する。</a:t>
                       </a:r>
-                      <a:endParaRPr kumimoji="1" lang="en-US" altLang="ja-JP" sz="1400" dirty="0"/>
+                      <a:endParaRPr kumimoji="1" lang="en-US" altLang="ja-JP" sz="1400" strike="sngStrike" baseline="0" dirty="0">
+                        <a:solidFill>
+                          <a:srgbClr val="FF0000"/>
+                        </a:solidFill>
+                      </a:endParaRPr>
                     </a:p>
                   </a:txBody>
                   <a:tcPr/>

</xml_diff>